<commit_message>
Explanation Note + Presentation
</commit_message>
<xml_diff>
--- a/Лицейский.pptx
+++ b/Лицейский.pptx
@@ -20,9 +20,9 @@
     <p:sldId id="315" r:id="rId11"/>
     <p:sldId id="318" r:id="rId12"/>
     <p:sldId id="317" r:id="rId13"/>
-    <p:sldId id="322" r:id="rId14"/>
-    <p:sldId id="319" r:id="rId15"/>
-    <p:sldId id="321" r:id="rId16"/>
+    <p:sldId id="319" r:id="rId14"/>
+    <p:sldId id="321" r:id="rId15"/>
+    <p:sldId id="322" r:id="rId16"/>
     <p:sldId id="297" r:id="rId17"/>
   </p:sldIdLst>
   <p:sldSz cx="12192000" cy="6858000"/>
@@ -702,7 +702,7 @@
     </p:spTree>
     <p:extLst>
       <p:ext uri="{BB962C8B-B14F-4D97-AF65-F5344CB8AC3E}">
-        <p14:creationId xmlns:p14="http://schemas.microsoft.com/office/powerpoint/2010/main" val="2508814883"/>
+        <p14:creationId xmlns:p14="http://schemas.microsoft.com/office/powerpoint/2010/main" val="4110138705"/>
       </p:ext>
     </p:extLst>
   </p:cSld>
@@ -785,7 +785,7 @@
     </p:spTree>
     <p:extLst>
       <p:ext uri="{BB962C8B-B14F-4D97-AF65-F5344CB8AC3E}">
-        <p14:creationId xmlns:p14="http://schemas.microsoft.com/office/powerpoint/2010/main" val="4110138705"/>
+        <p14:creationId xmlns:p14="http://schemas.microsoft.com/office/powerpoint/2010/main" val="3047668310"/>
       </p:ext>
     </p:extLst>
   </p:cSld>
@@ -868,7 +868,7 @@
     </p:spTree>
     <p:extLst>
       <p:ext uri="{BB962C8B-B14F-4D97-AF65-F5344CB8AC3E}">
-        <p14:creationId xmlns:p14="http://schemas.microsoft.com/office/powerpoint/2010/main" val="3047668310"/>
+        <p14:creationId xmlns:p14="http://schemas.microsoft.com/office/powerpoint/2010/main" val="2508814883"/>
       </p:ext>
     </p:extLst>
   </p:cSld>
@@ -17857,6 +17857,66 @@
           </a:p>
         </p:txBody>
       </p:sp>
+      <p:sp>
+        <p:nvSpPr>
+          <p:cNvPr id="3" name="TextBox 2">
+            <a:extLst>
+              <a:ext uri="{FF2B5EF4-FFF2-40B4-BE49-F238E27FC236}">
+                <a16:creationId xmlns:a16="http://schemas.microsoft.com/office/drawing/2014/main" id="{FC6E7541-2069-C6D8-322A-585DD2904C48}"/>
+              </a:ext>
+            </a:extLst>
+          </p:cNvPr>
+          <p:cNvSpPr txBox="1"/>
+          <p:nvPr/>
+        </p:nvSpPr>
+        <p:spPr>
+          <a:xfrm>
+            <a:off x="4551346" y="3429000"/>
+            <a:ext cx="3089307" cy="369332"/>
+          </a:xfrm>
+          <a:prstGeom prst="rect">
+            <a:avLst/>
+          </a:prstGeom>
+          <a:noFill/>
+        </p:spPr>
+        <p:txBody>
+          <a:bodyPr wrap="none" rtlCol="0">
+            <a:spAutoFit/>
+          </a:bodyPr>
+          <a:lstStyle/>
+          <a:p>
+            <a:r>
+              <a:rPr lang="ru-RU" dirty="0">
+                <a:solidFill>
+                  <a:schemeClr val="accent6"/>
+                </a:solidFill>
+              </a:rPr>
+              <a:t>Автор идеи</a:t>
+            </a:r>
+            <a:r>
+              <a:rPr lang="en-US" dirty="0">
+                <a:solidFill>
+                  <a:schemeClr val="accent6"/>
+                </a:solidFill>
+              </a:rPr>
+              <a:t>: </a:t>
+            </a:r>
+            <a:r>
+              <a:rPr lang="ru-RU" dirty="0">
+                <a:solidFill>
+                  <a:schemeClr val="accent6"/>
+                </a:solidFill>
+              </a:rPr>
+              <a:t>Елисей Коннов</a:t>
+            </a:r>
+            <a:endParaRPr lang="en-US" dirty="0">
+              <a:solidFill>
+                <a:schemeClr val="accent6"/>
+              </a:solidFill>
+            </a:endParaRPr>
+          </a:p>
+        </p:txBody>
+      </p:sp>
     </p:spTree>
     <p:extLst>
       <p:ext uri="{BB962C8B-B14F-4D97-AF65-F5344CB8AC3E}">
@@ -17871,6 +17931,413 @@
 </file>
 
 <file path=ppt/slides/slide10.xml><?xml version="1.0" encoding="utf-8"?>
+<p:sld xmlns:a="http://schemas.openxmlformats.org/drawingml/2006/main" xmlns:r="http://schemas.openxmlformats.org/officeDocument/2006/relationships" xmlns:p="http://schemas.openxmlformats.org/presentationml/2006/main">
+  <p:cSld>
+    <p:spTree>
+      <p:nvGrpSpPr>
+        <p:cNvPr id="1" name=""/>
+        <p:cNvGrpSpPr/>
+        <p:nvPr/>
+      </p:nvGrpSpPr>
+      <p:grpSpPr>
+        <a:xfrm>
+          <a:off x="0" y="0"/>
+          <a:ext cx="0" cy="0"/>
+          <a:chOff x="0" y="0"/>
+          <a:chExt cx="0" cy="0"/>
+        </a:xfrm>
+      </p:grpSpPr>
+      <p:sp>
+        <p:nvSpPr>
+          <p:cNvPr id="5" name="Title 4">
+            <a:extLst>
+              <a:ext uri="{FF2B5EF4-FFF2-40B4-BE49-F238E27FC236}">
+                <a16:creationId xmlns:a16="http://schemas.microsoft.com/office/drawing/2014/main" id="{2136FCF6-982C-CC37-9625-3EBFC7E7DD13}"/>
+              </a:ext>
+            </a:extLst>
+          </p:cNvPr>
+          <p:cNvSpPr>
+            <a:spLocks noGrp="1"/>
+          </p:cNvSpPr>
+          <p:nvPr>
+            <p:ph type="title"/>
+          </p:nvPr>
+        </p:nvSpPr>
+        <p:spPr>
+          <a:xfrm>
+            <a:off x="1550563" y="1089213"/>
+            <a:ext cx="9879437" cy="980844"/>
+          </a:xfrm>
+        </p:spPr>
+        <p:txBody>
+          <a:bodyPr/>
+          <a:lstStyle/>
+          <a:p>
+            <a:r>
+              <a:rPr lang="ru-RU" dirty="0"/>
+              <a:t>что ещё стоит рассказать</a:t>
+            </a:r>
+            <a:endParaRPr lang="en-US" dirty="0"/>
+          </a:p>
+        </p:txBody>
+      </p:sp>
+      <p:sp>
+        <p:nvSpPr>
+          <p:cNvPr id="4" name="Text Placeholder 3">
+            <a:extLst>
+              <a:ext uri="{FF2B5EF4-FFF2-40B4-BE49-F238E27FC236}">
+                <a16:creationId xmlns:a16="http://schemas.microsoft.com/office/drawing/2014/main" id="{97DCC342-9FD1-7055-EAAC-008DC851B13F}"/>
+              </a:ext>
+            </a:extLst>
+          </p:cNvPr>
+          <p:cNvSpPr>
+            <a:spLocks noGrp="1"/>
+          </p:cNvSpPr>
+          <p:nvPr>
+            <p:ph type="body" sz="quarter" idx="13"/>
+          </p:nvPr>
+        </p:nvSpPr>
+        <p:spPr>
+          <a:xfrm>
+            <a:off x="1550564" y="2331958"/>
+            <a:ext cx="2975217" cy="3704266"/>
+          </a:xfrm>
+        </p:spPr>
+        <p:txBody>
+          <a:bodyPr/>
+          <a:lstStyle/>
+          <a:p>
+            <a:r>
+              <a:rPr lang="ru-RU" dirty="0"/>
+              <a:t>Есть страницы категорий. Там их описания и статьи данной категории.</a:t>
+            </a:r>
+          </a:p>
+        </p:txBody>
+      </p:sp>
+      <p:sp>
+        <p:nvSpPr>
+          <p:cNvPr id="2" name="Slide Number Placeholder 1">
+            <a:extLst>
+              <a:ext uri="{FF2B5EF4-FFF2-40B4-BE49-F238E27FC236}">
+                <a16:creationId xmlns:a16="http://schemas.microsoft.com/office/drawing/2014/main" id="{A913EEC9-16E3-6C86-97D0-A7EC7EA09CDA}"/>
+              </a:ext>
+            </a:extLst>
+          </p:cNvPr>
+          <p:cNvSpPr>
+            <a:spLocks noGrp="1"/>
+          </p:cNvSpPr>
+          <p:nvPr>
+            <p:ph type="sldNum" sz="quarter" idx="10"/>
+          </p:nvPr>
+        </p:nvSpPr>
+        <p:spPr>
+          <a:xfrm>
+            <a:off x="10358437" y="457199"/>
+            <a:ext cx="1067589" cy="471489"/>
+          </a:xfrm>
+        </p:spPr>
+        <p:txBody>
+          <a:bodyPr/>
+          <a:lstStyle/>
+          <a:p>
+            <a:fld id="{48F63A3B-78C7-47BE-AE5E-E10140E04643}" type="slidenum">
+              <a:rPr lang="en-US" smtClean="0"/>
+              <a:pPr/>
+              <a:t>10</a:t>
+            </a:fld>
+            <a:endParaRPr lang="en-US" dirty="0"/>
+          </a:p>
+        </p:txBody>
+      </p:sp>
+      <p:sp>
+        <p:nvSpPr>
+          <p:cNvPr id="7" name="Content Placeholder 6">
+            <a:extLst>
+              <a:ext uri="{FF2B5EF4-FFF2-40B4-BE49-F238E27FC236}">
+                <a16:creationId xmlns:a16="http://schemas.microsoft.com/office/drawing/2014/main" id="{C98A5B00-A4D2-3FF2-1795-D9FA54034DA2}"/>
+              </a:ext>
+            </a:extLst>
+          </p:cNvPr>
+          <p:cNvSpPr>
+            <a:spLocks noGrp="1"/>
+          </p:cNvSpPr>
+          <p:nvPr>
+            <p:ph sz="half" idx="1"/>
+          </p:nvPr>
+        </p:nvSpPr>
+        <p:spPr/>
+        <p:txBody>
+          <a:bodyPr/>
+          <a:lstStyle/>
+          <a:p>
+            <a:r>
+              <a:rPr lang="ru-RU" dirty="0"/>
+              <a:t>Собственные статьи можно редактировать и просматривать, вне зависимости от их состояния (Черновик</a:t>
+            </a:r>
+            <a:r>
+              <a:rPr lang="en-US" dirty="0"/>
+              <a:t>/</a:t>
+            </a:r>
+            <a:r>
+              <a:rPr lang="ru-RU" dirty="0"/>
+              <a:t>Опубликовано</a:t>
+            </a:r>
+            <a:r>
+              <a:rPr lang="en-US" dirty="0"/>
+              <a:t>/</a:t>
+            </a:r>
+            <a:r>
+              <a:rPr lang="ru-RU" dirty="0"/>
+              <a:t>Архивировано)</a:t>
+            </a:r>
+          </a:p>
+          <a:p>
+            <a:endParaRPr lang="en-US" dirty="0"/>
+          </a:p>
+        </p:txBody>
+      </p:sp>
+    </p:spTree>
+    <p:extLst>
+      <p:ext uri="{BB962C8B-B14F-4D97-AF65-F5344CB8AC3E}">
+        <p14:creationId xmlns:p14="http://schemas.microsoft.com/office/powerpoint/2010/main" val="3969996159"/>
+      </p:ext>
+    </p:extLst>
+  </p:cSld>
+  <p:clrMapOvr>
+    <a:masterClrMapping/>
+  </p:clrMapOvr>
+</p:sld>
+</file>
+
+<file path=ppt/slides/slide11.xml><?xml version="1.0" encoding="utf-8"?>
+<p:sld xmlns:a="http://schemas.openxmlformats.org/drawingml/2006/main" xmlns:r="http://schemas.openxmlformats.org/officeDocument/2006/relationships" xmlns:p="http://schemas.openxmlformats.org/presentationml/2006/main">
+  <p:cSld>
+    <p:spTree>
+      <p:nvGrpSpPr>
+        <p:cNvPr id="1" name=""/>
+        <p:cNvGrpSpPr/>
+        <p:nvPr/>
+      </p:nvGrpSpPr>
+      <p:grpSpPr>
+        <a:xfrm>
+          <a:off x="0" y="0"/>
+          <a:ext cx="0" cy="0"/>
+          <a:chOff x="0" y="0"/>
+          <a:chExt cx="0" cy="0"/>
+        </a:xfrm>
+      </p:grpSpPr>
+      <p:sp>
+        <p:nvSpPr>
+          <p:cNvPr id="3" name="Title 2">
+            <a:extLst>
+              <a:ext uri="{FF2B5EF4-FFF2-40B4-BE49-F238E27FC236}">
+                <a16:creationId xmlns:a16="http://schemas.microsoft.com/office/drawing/2014/main" id="{38D62608-F5E4-7EC0-5EF0-4F988DDDEC5B}"/>
+              </a:ext>
+            </a:extLst>
+          </p:cNvPr>
+          <p:cNvSpPr>
+            <a:spLocks noGrp="1"/>
+          </p:cNvSpPr>
+          <p:nvPr>
+            <p:ph type="title"/>
+          </p:nvPr>
+        </p:nvSpPr>
+        <p:spPr>
+          <a:xfrm>
+            <a:off x="1550564" y="1057274"/>
+            <a:ext cx="9875463" cy="999746"/>
+          </a:xfrm>
+        </p:spPr>
+        <p:txBody>
+          <a:bodyPr/>
+          <a:lstStyle/>
+          <a:p>
+            <a:r>
+              <a:rPr lang="ru-RU" dirty="0"/>
+              <a:t>Заключение и возможности для развития</a:t>
+            </a:r>
+            <a:endParaRPr lang="en-US" dirty="0"/>
+          </a:p>
+        </p:txBody>
+      </p:sp>
+      <p:sp>
+        <p:nvSpPr>
+          <p:cNvPr id="12" name="Content Placeholder 3">
+            <a:extLst>
+              <a:ext uri="{FF2B5EF4-FFF2-40B4-BE49-F238E27FC236}">
+                <a16:creationId xmlns:a16="http://schemas.microsoft.com/office/drawing/2014/main" id="{288BD9B8-D6A6-D55A-830D-4D3CC2DC3933}"/>
+              </a:ext>
+            </a:extLst>
+          </p:cNvPr>
+          <p:cNvSpPr>
+            <a:spLocks noGrp="1"/>
+          </p:cNvSpPr>
+          <p:nvPr>
+            <p:ph sz="half" idx="2"/>
+          </p:nvPr>
+        </p:nvSpPr>
+        <p:spPr>
+          <a:xfrm>
+            <a:off x="1550565" y="2303028"/>
+            <a:ext cx="5254368" cy="3961593"/>
+          </a:xfrm>
+        </p:spPr>
+        <p:txBody>
+          <a:bodyPr>
+            <a:normAutofit/>
+          </a:bodyPr>
+          <a:lstStyle/>
+          <a:p>
+            <a:r>
+              <a:rPr lang="ru-RU" dirty="0"/>
+              <a:t>Этот проект оказалось реализовывать сложнее, чем я думал.</a:t>
+            </a:r>
+          </a:p>
+          <a:p>
+            <a:r>
+              <a:rPr lang="ru-RU" dirty="0"/>
+              <a:t>Я возненавидел веб-разработку</a:t>
+            </a:r>
+          </a:p>
+          <a:p>
+            <a:r>
+              <a:rPr lang="ru-RU" dirty="0"/>
+              <a:t>Сайт выглядит не так плохо, как мог бы</a:t>
+            </a:r>
+          </a:p>
+          <a:p>
+            <a:r>
+              <a:rPr lang="ru-RU" dirty="0"/>
+              <a:t>Однако как-то так сложилось, что он хорошо организован и лёгок для добавления новых функций.</a:t>
+            </a:r>
+          </a:p>
+        </p:txBody>
+      </p:sp>
+      <p:sp>
+        <p:nvSpPr>
+          <p:cNvPr id="13" name="Content Placeholder 7">
+            <a:extLst>
+              <a:ext uri="{FF2B5EF4-FFF2-40B4-BE49-F238E27FC236}">
+                <a16:creationId xmlns:a16="http://schemas.microsoft.com/office/drawing/2014/main" id="{0853098E-C088-D323-4BF2-987893F262F6}"/>
+              </a:ext>
+            </a:extLst>
+          </p:cNvPr>
+          <p:cNvSpPr>
+            <a:spLocks noGrp="1"/>
+          </p:cNvSpPr>
+          <p:nvPr>
+            <p:ph sz="half" idx="15"/>
+          </p:nvPr>
+        </p:nvSpPr>
+        <p:spPr>
+          <a:xfrm>
+            <a:off x="7221311" y="2303028"/>
+            <a:ext cx="4204715" cy="3961593"/>
+          </a:xfrm>
+        </p:spPr>
+        <p:txBody>
+          <a:bodyPr/>
+          <a:lstStyle/>
+          <a:p>
+            <a:r>
+              <a:rPr lang="ru-RU" dirty="0"/>
+              <a:t>Разные темы оформления</a:t>
+            </a:r>
+          </a:p>
+          <a:p>
+            <a:r>
+              <a:rPr lang="ru-RU" dirty="0"/>
+              <a:t>Мультиязычность</a:t>
+            </a:r>
+          </a:p>
+          <a:p>
+            <a:r>
+              <a:rPr lang="ru-RU" dirty="0"/>
+              <a:t>Улучшение дизайна</a:t>
+            </a:r>
+          </a:p>
+          <a:p>
+            <a:r>
+              <a:rPr lang="ru-RU" dirty="0"/>
+              <a:t>Реализацию ролей (администратор, автор, редактор и т.д.)</a:t>
+            </a:r>
+          </a:p>
+          <a:p>
+            <a:r>
+              <a:rPr lang="ru-RU" dirty="0"/>
+              <a:t>Восстановление пароля</a:t>
+            </a:r>
+          </a:p>
+          <a:p>
+            <a:r>
+              <a:rPr lang="ru-RU" dirty="0"/>
+              <a:t>Подтверждение почты</a:t>
+            </a:r>
+          </a:p>
+          <a:p>
+            <a:r>
+              <a:rPr lang="ru-RU" dirty="0"/>
+              <a:t>Карма</a:t>
+            </a:r>
+          </a:p>
+          <a:p>
+            <a:r>
+              <a:rPr lang="ru-RU" dirty="0"/>
+              <a:t>Административные функции</a:t>
+            </a:r>
+            <a:endParaRPr lang="en-US" dirty="0"/>
+          </a:p>
+        </p:txBody>
+      </p:sp>
+      <p:sp>
+        <p:nvSpPr>
+          <p:cNvPr id="2" name="Slide Number Placeholder 1">
+            <a:extLst>
+              <a:ext uri="{FF2B5EF4-FFF2-40B4-BE49-F238E27FC236}">
+                <a16:creationId xmlns:a16="http://schemas.microsoft.com/office/drawing/2014/main" id="{1DCFAD14-1AAA-8CDA-A49B-523FD6C66F35}"/>
+              </a:ext>
+            </a:extLst>
+          </p:cNvPr>
+          <p:cNvSpPr>
+            <a:spLocks noGrp="1"/>
+          </p:cNvSpPr>
+          <p:nvPr>
+            <p:ph type="sldNum" sz="quarter" idx="10"/>
+          </p:nvPr>
+        </p:nvSpPr>
+        <p:spPr>
+          <a:xfrm>
+            <a:off x="10438475" y="457199"/>
+            <a:ext cx="987552" cy="471489"/>
+          </a:xfrm>
+        </p:spPr>
+        <p:txBody>
+          <a:bodyPr/>
+          <a:lstStyle/>
+          <a:p>
+            <a:fld id="{48F63A3B-78C7-47BE-AE5E-E10140E04643}" type="slidenum">
+              <a:rPr lang="en-US" smtClean="0"/>
+              <a:pPr/>
+              <a:t>11</a:t>
+            </a:fld>
+            <a:endParaRPr lang="en-US" dirty="0"/>
+          </a:p>
+        </p:txBody>
+      </p:sp>
+    </p:spTree>
+    <p:extLst>
+      <p:ext uri="{BB962C8B-B14F-4D97-AF65-F5344CB8AC3E}">
+        <p14:creationId xmlns:p14="http://schemas.microsoft.com/office/powerpoint/2010/main" val="2498021601"/>
+      </p:ext>
+    </p:extLst>
+  </p:cSld>
+  <p:clrMapOvr>
+    <a:masterClrMapping/>
+  </p:clrMapOvr>
+</p:sld>
+</file>
+
+<file path=ppt/slides/slide12.xml><?xml version="1.0" encoding="utf-8"?>
 <p:sld xmlns:a="http://schemas.openxmlformats.org/drawingml/2006/main" xmlns:r="http://schemas.openxmlformats.org/officeDocument/2006/relationships" xmlns:p="http://schemas.openxmlformats.org/presentationml/2006/main">
   <p:cSld>
     <p:spTree>
@@ -17915,7 +18382,7 @@
           <a:p>
             <a:r>
               <a:rPr lang="ru-RU" dirty="0"/>
-              <a:t>Категории</a:t>
+              <a:t>Демонстрация И ВОпросы</a:t>
             </a:r>
             <a:endParaRPr lang="en-US" dirty="0"/>
           </a:p>
@@ -17950,7 +18417,7 @@
             <a:fld id="{48F63A3B-78C7-47BE-AE5E-E10140E04643}" type="slidenum">
               <a:rPr lang="en-US" smtClean="0"/>
               <a:pPr/>
-              <a:t>10</a:t>
+              <a:t>12</a:t>
             </a:fld>
             <a:endParaRPr lang="en-US" dirty="0"/>
           </a:p>
@@ -17979,10 +18446,14 @@
           <a:p>
             <a:r>
               <a:rPr lang="ru-RU" dirty="0"/>
-              <a:t>Строгое распределение новостей, которое создаётся администраторами сайта.</a:t>
+              <a:t>Давайте подождём, пока я открою сайт</a:t>
             </a:r>
           </a:p>
           <a:p>
+            <a:r>
+              <a:rPr lang="ru-RU" dirty="0"/>
+              <a:t>Есть вероятность того, что вы потом будете задавать мне вопросы</a:t>
+            </a:r>
             <a:endParaRPr lang="en-US" dirty="0"/>
           </a:p>
         </p:txBody>
@@ -17991,833 +18462,6 @@
     <p:extLst>
       <p:ext uri="{BB962C8B-B14F-4D97-AF65-F5344CB8AC3E}">
         <p14:creationId xmlns:p14="http://schemas.microsoft.com/office/powerpoint/2010/main" val="1686213229"/>
-      </p:ext>
-    </p:extLst>
-  </p:cSld>
-  <p:clrMapOvr>
-    <a:masterClrMapping/>
-  </p:clrMapOvr>
-</p:sld>
-</file>
-
-<file path=ppt/slides/slide11.xml><?xml version="1.0" encoding="utf-8"?>
-<p:sld xmlns:a="http://schemas.openxmlformats.org/drawingml/2006/main" xmlns:r="http://schemas.openxmlformats.org/officeDocument/2006/relationships" xmlns:p="http://schemas.openxmlformats.org/presentationml/2006/main">
-  <p:cSld>
-    <p:spTree>
-      <p:nvGrpSpPr>
-        <p:cNvPr id="1" name=""/>
-        <p:cNvGrpSpPr/>
-        <p:nvPr/>
-      </p:nvGrpSpPr>
-      <p:grpSpPr>
-        <a:xfrm>
-          <a:off x="0" y="0"/>
-          <a:ext cx="0" cy="0"/>
-          <a:chOff x="0" y="0"/>
-          <a:chExt cx="0" cy="0"/>
-        </a:xfrm>
-      </p:grpSpPr>
-      <p:sp>
-        <p:nvSpPr>
-          <p:cNvPr id="5" name="Title 4">
-            <a:extLst>
-              <a:ext uri="{FF2B5EF4-FFF2-40B4-BE49-F238E27FC236}">
-                <a16:creationId xmlns:a16="http://schemas.microsoft.com/office/drawing/2014/main" id="{2136FCF6-982C-CC37-9625-3EBFC7E7DD13}"/>
-              </a:ext>
-            </a:extLst>
-          </p:cNvPr>
-          <p:cNvSpPr>
-            <a:spLocks noGrp="1"/>
-          </p:cNvSpPr>
-          <p:nvPr>
-            <p:ph type="title"/>
-          </p:nvPr>
-        </p:nvSpPr>
-        <p:spPr>
-          <a:xfrm>
-            <a:off x="1550563" y="1089213"/>
-            <a:ext cx="9879437" cy="980844"/>
-          </a:xfrm>
-        </p:spPr>
-        <p:txBody>
-          <a:bodyPr/>
-          <a:lstStyle/>
-          <a:p>
-            <a:r>
-              <a:rPr lang="ru-RU" dirty="0"/>
-              <a:t>Какой-то умный слайд с табличкой</a:t>
-            </a:r>
-            <a:endParaRPr lang="en-US" dirty="0"/>
-          </a:p>
-        </p:txBody>
-      </p:sp>
-      <p:sp>
-        <p:nvSpPr>
-          <p:cNvPr id="4" name="Text Placeholder 3">
-            <a:extLst>
-              <a:ext uri="{FF2B5EF4-FFF2-40B4-BE49-F238E27FC236}">
-                <a16:creationId xmlns:a16="http://schemas.microsoft.com/office/drawing/2014/main" id="{97DCC342-9FD1-7055-EAAC-008DC851B13F}"/>
-              </a:ext>
-            </a:extLst>
-          </p:cNvPr>
-          <p:cNvSpPr>
-            <a:spLocks noGrp="1"/>
-          </p:cNvSpPr>
-          <p:nvPr>
-            <p:ph type="body" sz="quarter" idx="13"/>
-          </p:nvPr>
-        </p:nvSpPr>
-        <p:spPr>
-          <a:xfrm>
-            <a:off x="1550564" y="2331958"/>
-            <a:ext cx="2975217" cy="3704266"/>
-          </a:xfrm>
-        </p:spPr>
-        <p:txBody>
-          <a:bodyPr/>
-          <a:lstStyle/>
-          <a:p>
-            <a:r>
-              <a:rPr lang="ru-RU" dirty="0"/>
-              <a:t>Тут пока пусто, но я чего-нибудь добавлю для веселья</a:t>
-            </a:r>
-            <a:endParaRPr lang="en-US" dirty="0"/>
-          </a:p>
-        </p:txBody>
-      </p:sp>
-      <p:graphicFrame>
-        <p:nvGraphicFramePr>
-          <p:cNvPr id="6" name="Content Placeholder 5">
-            <a:extLst>
-              <a:ext uri="{FF2B5EF4-FFF2-40B4-BE49-F238E27FC236}">
-                <a16:creationId xmlns:a16="http://schemas.microsoft.com/office/drawing/2014/main" id="{4DB3991E-0605-C20E-53AD-D64E13638DA5}"/>
-              </a:ext>
-            </a:extLst>
-          </p:cNvPr>
-          <p:cNvGraphicFramePr>
-            <a:graphicFrameLocks noGrp="1"/>
-          </p:cNvGraphicFramePr>
-          <p:nvPr>
-            <p:ph sz="half" idx="1"/>
-            <p:extLst>
-              <p:ext uri="{D42A27DB-BD31-4B8C-83A1-F6EECF244321}">
-                <p14:modId xmlns:p14="http://schemas.microsoft.com/office/powerpoint/2010/main" val="2133818870"/>
-              </p:ext>
-            </p:extLst>
-          </p:nvPr>
-        </p:nvGraphicFramePr>
-        <p:xfrm>
-          <a:off x="5087938" y="2332038"/>
-          <a:ext cx="6345236" cy="3879279"/>
-        </p:xfrm>
-        <a:graphic>
-          <a:graphicData uri="http://schemas.openxmlformats.org/drawingml/2006/table">
-            <a:tbl>
-              <a:tblPr firstRow="1" bandRow="1">
-                <a:tableStyleId>{3B4B98B0-60AC-42C2-AFA5-B58CD77FA1E5}</a:tableStyleId>
-              </a:tblPr>
-              <a:tblGrid>
-                <a:gridCol w="2227408">
-                  <a:extLst>
-                    <a:ext uri="{9D8B030D-6E8A-4147-A177-3AD203B41FA5}">
-                      <a16:colId xmlns:a16="http://schemas.microsoft.com/office/drawing/2014/main" val="180956085"/>
-                    </a:ext>
-                  </a:extLst>
-                </a:gridCol>
-                <a:gridCol w="2227408">
-                  <a:extLst>
-                    <a:ext uri="{9D8B030D-6E8A-4147-A177-3AD203B41FA5}">
-                      <a16:colId xmlns:a16="http://schemas.microsoft.com/office/drawing/2014/main" val="1180706872"/>
-                    </a:ext>
-                  </a:extLst>
-                </a:gridCol>
-                <a:gridCol w="945210">
-                  <a:extLst>
-                    <a:ext uri="{9D8B030D-6E8A-4147-A177-3AD203B41FA5}">
-                      <a16:colId xmlns:a16="http://schemas.microsoft.com/office/drawing/2014/main" val="2050154702"/>
-                    </a:ext>
-                  </a:extLst>
-                </a:gridCol>
-                <a:gridCol w="945210">
-                  <a:extLst>
-                    <a:ext uri="{9D8B030D-6E8A-4147-A177-3AD203B41FA5}">
-                      <a16:colId xmlns:a16="http://schemas.microsoft.com/office/drawing/2014/main" val="1872764148"/>
-                    </a:ext>
-                  </a:extLst>
-                </a:gridCol>
-              </a:tblGrid>
-              <a:tr h="606129">
-                <a:tc>
-                  <a:txBody>
-                    <a:bodyPr/>
-                    <a:lstStyle/>
-                    <a:p>
-                      <a:r>
-                        <a:rPr lang="en-US" dirty="0">
-                          <a:solidFill>
-                            <a:schemeClr val="accent6"/>
-                          </a:solidFill>
-                        </a:rPr>
-                        <a:t>Metric</a:t>
-                      </a:r>
-                    </a:p>
-                  </a:txBody>
-                  <a:tcPr anchor="ctr"/>
-                </a:tc>
-                <a:tc>
-                  <a:txBody>
-                    <a:bodyPr/>
-                    <a:lstStyle/>
-                    <a:p>
-                      <a:r>
-                        <a:rPr lang="en-US" dirty="0">
-                          <a:solidFill>
-                            <a:schemeClr val="accent6"/>
-                          </a:solidFill>
-                        </a:rPr>
-                        <a:t>Measurement</a:t>
-                      </a:r>
-                    </a:p>
-                  </a:txBody>
-                  <a:tcPr anchor="ctr"/>
-                </a:tc>
-                <a:tc>
-                  <a:txBody>
-                    <a:bodyPr/>
-                    <a:lstStyle/>
-                    <a:p>
-                      <a:r>
-                        <a:rPr lang="en-US" dirty="0">
-                          <a:solidFill>
-                            <a:schemeClr val="accent6"/>
-                          </a:solidFill>
-                        </a:rPr>
-                        <a:t>Target</a:t>
-                      </a:r>
-                    </a:p>
-                  </a:txBody>
-                  <a:tcPr anchor="ctr"/>
-                </a:tc>
-                <a:tc>
-                  <a:txBody>
-                    <a:bodyPr/>
-                    <a:lstStyle/>
-                    <a:p>
-                      <a:r>
-                        <a:rPr lang="en-US" dirty="0">
-                          <a:solidFill>
-                            <a:schemeClr val="accent6"/>
-                          </a:solidFill>
-                        </a:rPr>
-                        <a:t>Actual</a:t>
-                      </a:r>
-                    </a:p>
-                  </a:txBody>
-                  <a:tcPr anchor="ctr"/>
-                </a:tc>
-                <a:extLst>
-                  <a:ext uri="{0D108BD9-81ED-4DB2-BD59-A6C34878D82A}">
-                    <a16:rowId xmlns:a16="http://schemas.microsoft.com/office/drawing/2014/main" val="3059142786"/>
-                  </a:ext>
-                </a:extLst>
-              </a:tr>
-              <a:tr h="606129">
-                <a:tc>
-                  <a:txBody>
-                    <a:bodyPr/>
-                    <a:lstStyle/>
-                    <a:p>
-                      <a:r>
-                        <a:rPr lang="en-US" dirty="0">
-                          <a:solidFill>
-                            <a:schemeClr val="accent6"/>
-                          </a:solidFill>
-                        </a:rPr>
-                        <a:t>Audience attendance</a:t>
-                      </a:r>
-                    </a:p>
-                  </a:txBody>
-                  <a:tcPr anchor="ctr"/>
-                </a:tc>
-                <a:tc>
-                  <a:txBody>
-                    <a:bodyPr/>
-                    <a:lstStyle/>
-                    <a:p>
-                      <a:r>
-                        <a:rPr lang="en-US" dirty="0">
-                          <a:solidFill>
-                            <a:schemeClr val="accent6"/>
-                          </a:solidFill>
-                        </a:rPr>
-                        <a:t># of attendees</a:t>
-                      </a:r>
-                    </a:p>
-                  </a:txBody>
-                  <a:tcPr anchor="ctr"/>
-                </a:tc>
-                <a:tc>
-                  <a:txBody>
-                    <a:bodyPr/>
-                    <a:lstStyle/>
-                    <a:p>
-                      <a:r>
-                        <a:rPr lang="en-US" dirty="0">
-                          <a:solidFill>
-                            <a:schemeClr val="accent6"/>
-                          </a:solidFill>
-                        </a:rPr>
-                        <a:t>150</a:t>
-                      </a:r>
-                    </a:p>
-                  </a:txBody>
-                  <a:tcPr anchor="ctr"/>
-                </a:tc>
-                <a:tc>
-                  <a:txBody>
-                    <a:bodyPr/>
-                    <a:lstStyle/>
-                    <a:p>
-                      <a:r>
-                        <a:rPr lang="en-US" dirty="0">
-                          <a:solidFill>
-                            <a:schemeClr val="accent6"/>
-                          </a:solidFill>
-                        </a:rPr>
-                        <a:t>120</a:t>
-                      </a:r>
-                    </a:p>
-                  </a:txBody>
-                  <a:tcPr anchor="ctr"/>
-                </a:tc>
-                <a:extLst>
-                  <a:ext uri="{0D108BD9-81ED-4DB2-BD59-A6C34878D82A}">
-                    <a16:rowId xmlns:a16="http://schemas.microsoft.com/office/drawing/2014/main" val="3588576737"/>
-                  </a:ext>
-                </a:extLst>
-              </a:tr>
-              <a:tr h="643498">
-                <a:tc>
-                  <a:txBody>
-                    <a:bodyPr/>
-                    <a:lstStyle/>
-                    <a:p>
-                      <a:r>
-                        <a:rPr lang="en-US" dirty="0">
-                          <a:solidFill>
-                            <a:schemeClr val="accent6"/>
-                          </a:solidFill>
-                        </a:rPr>
-                        <a:t>Engagement duration</a:t>
-                      </a:r>
-                    </a:p>
-                  </a:txBody>
-                  <a:tcPr anchor="ctr"/>
-                </a:tc>
-                <a:tc>
-                  <a:txBody>
-                    <a:bodyPr/>
-                    <a:lstStyle/>
-                    <a:p>
-                      <a:r>
-                        <a:rPr lang="en-US" dirty="0">
-                          <a:solidFill>
-                            <a:schemeClr val="accent6"/>
-                          </a:solidFill>
-                        </a:rPr>
-                        <a:t>Minutes</a:t>
-                      </a:r>
-                    </a:p>
-                  </a:txBody>
-                  <a:tcPr anchor="ctr"/>
-                </a:tc>
-                <a:tc>
-                  <a:txBody>
-                    <a:bodyPr/>
-                    <a:lstStyle/>
-                    <a:p>
-                      <a:r>
-                        <a:rPr lang="en-US" dirty="0">
-                          <a:solidFill>
-                            <a:schemeClr val="accent6"/>
-                          </a:solidFill>
-                        </a:rPr>
-                        <a:t>60</a:t>
-                      </a:r>
-                    </a:p>
-                  </a:txBody>
-                  <a:tcPr anchor="ctr"/>
-                </a:tc>
-                <a:tc>
-                  <a:txBody>
-                    <a:bodyPr/>
-                    <a:lstStyle/>
-                    <a:p>
-                      <a:r>
-                        <a:rPr lang="en-US" dirty="0">
-                          <a:solidFill>
-                            <a:schemeClr val="accent6"/>
-                          </a:solidFill>
-                        </a:rPr>
-                        <a:t>75</a:t>
-                      </a:r>
-                    </a:p>
-                  </a:txBody>
-                  <a:tcPr anchor="ctr"/>
-                </a:tc>
-                <a:extLst>
-                  <a:ext uri="{0D108BD9-81ED-4DB2-BD59-A6C34878D82A}">
-                    <a16:rowId xmlns:a16="http://schemas.microsoft.com/office/drawing/2014/main" val="1626410507"/>
-                  </a:ext>
-                </a:extLst>
-              </a:tr>
-              <a:tr h="606129">
-                <a:tc>
-                  <a:txBody>
-                    <a:bodyPr/>
-                    <a:lstStyle/>
-                    <a:p>
-                      <a:r>
-                        <a:rPr lang="en-US" dirty="0">
-                          <a:solidFill>
-                            <a:schemeClr val="accent6"/>
-                          </a:solidFill>
-                        </a:rPr>
-                        <a:t>Q&amp;A interaction</a:t>
-                      </a:r>
-                    </a:p>
-                  </a:txBody>
-                  <a:tcPr anchor="ctr"/>
-                </a:tc>
-                <a:tc>
-                  <a:txBody>
-                    <a:bodyPr/>
-                    <a:lstStyle/>
-                    <a:p>
-                      <a:r>
-                        <a:rPr lang="en-US" dirty="0">
-                          <a:solidFill>
-                            <a:schemeClr val="accent6"/>
-                          </a:solidFill>
-                        </a:rPr>
-                        <a:t># of questions</a:t>
-                      </a:r>
-                    </a:p>
-                  </a:txBody>
-                  <a:tcPr anchor="ctr"/>
-                </a:tc>
-                <a:tc>
-                  <a:txBody>
-                    <a:bodyPr/>
-                    <a:lstStyle/>
-                    <a:p>
-                      <a:r>
-                        <a:rPr lang="en-US" dirty="0">
-                          <a:solidFill>
-                            <a:schemeClr val="accent6"/>
-                          </a:solidFill>
-                        </a:rPr>
-                        <a:t>10</a:t>
-                      </a:r>
-                    </a:p>
-                  </a:txBody>
-                  <a:tcPr anchor="ctr"/>
-                </a:tc>
-                <a:tc>
-                  <a:txBody>
-                    <a:bodyPr/>
-                    <a:lstStyle/>
-                    <a:p>
-                      <a:r>
-                        <a:rPr lang="en-US" dirty="0">
-                          <a:solidFill>
-                            <a:schemeClr val="accent6"/>
-                          </a:solidFill>
-                        </a:rPr>
-                        <a:t>15</a:t>
-                      </a:r>
-                    </a:p>
-                  </a:txBody>
-                  <a:tcPr anchor="ctr"/>
-                </a:tc>
-                <a:extLst>
-                  <a:ext uri="{0D108BD9-81ED-4DB2-BD59-A6C34878D82A}">
-                    <a16:rowId xmlns:a16="http://schemas.microsoft.com/office/drawing/2014/main" val="1888116840"/>
-                  </a:ext>
-                </a:extLst>
-              </a:tr>
-              <a:tr h="606129">
-                <a:tc>
-                  <a:txBody>
-                    <a:bodyPr/>
-                    <a:lstStyle/>
-                    <a:p>
-                      <a:r>
-                        <a:rPr lang="en-US" dirty="0">
-                          <a:solidFill>
-                            <a:schemeClr val="accent6"/>
-                          </a:solidFill>
-                        </a:rPr>
-                        <a:t>Positive feedback</a:t>
-                      </a:r>
-                    </a:p>
-                  </a:txBody>
-                  <a:tcPr anchor="ctr"/>
-                </a:tc>
-                <a:tc>
-                  <a:txBody>
-                    <a:bodyPr/>
-                    <a:lstStyle/>
-                    <a:p>
-                      <a:r>
-                        <a:rPr lang="en-US" dirty="0">
-                          <a:solidFill>
-                            <a:schemeClr val="accent6"/>
-                          </a:solidFill>
-                        </a:rPr>
-                        <a:t>Percentage (%)</a:t>
-                      </a:r>
-                    </a:p>
-                  </a:txBody>
-                  <a:tcPr anchor="ctr"/>
-                </a:tc>
-                <a:tc>
-                  <a:txBody>
-                    <a:bodyPr/>
-                    <a:lstStyle/>
-                    <a:p>
-                      <a:r>
-                        <a:rPr lang="en-US" dirty="0">
-                          <a:solidFill>
-                            <a:schemeClr val="accent6"/>
-                          </a:solidFill>
-                        </a:rPr>
-                        <a:t>90</a:t>
-                      </a:r>
-                    </a:p>
-                  </a:txBody>
-                  <a:tcPr anchor="ctr"/>
-                </a:tc>
-                <a:tc>
-                  <a:txBody>
-                    <a:bodyPr/>
-                    <a:lstStyle/>
-                    <a:p>
-                      <a:r>
-                        <a:rPr lang="en-US" dirty="0">
-                          <a:solidFill>
-                            <a:schemeClr val="accent6"/>
-                          </a:solidFill>
-                        </a:rPr>
-                        <a:t>95</a:t>
-                      </a:r>
-                    </a:p>
-                  </a:txBody>
-                  <a:tcPr anchor="ctr"/>
-                </a:tc>
-                <a:extLst>
-                  <a:ext uri="{0D108BD9-81ED-4DB2-BD59-A6C34878D82A}">
-                    <a16:rowId xmlns:a16="http://schemas.microsoft.com/office/drawing/2014/main" val="4023592559"/>
-                  </a:ext>
-                </a:extLst>
-              </a:tr>
-              <a:tr h="811265">
-                <a:tc>
-                  <a:txBody>
-                    <a:bodyPr/>
-                    <a:lstStyle/>
-                    <a:p>
-                      <a:r>
-                        <a:rPr lang="en-US" dirty="0">
-                          <a:solidFill>
-                            <a:schemeClr val="accent6"/>
-                          </a:solidFill>
-                        </a:rPr>
-                        <a:t>Rate of information retention</a:t>
-                      </a:r>
-                    </a:p>
-                  </a:txBody>
-                  <a:tcPr anchor="ctr"/>
-                </a:tc>
-                <a:tc>
-                  <a:txBody>
-                    <a:bodyPr/>
-                    <a:lstStyle/>
-                    <a:p>
-                      <a:r>
-                        <a:rPr lang="en-US" dirty="0">
-                          <a:solidFill>
-                            <a:schemeClr val="accent6"/>
-                          </a:solidFill>
-                        </a:rPr>
-                        <a:t>Percentage (%)</a:t>
-                      </a:r>
-                    </a:p>
-                  </a:txBody>
-                  <a:tcPr anchor="ctr"/>
-                </a:tc>
-                <a:tc>
-                  <a:txBody>
-                    <a:bodyPr/>
-                    <a:lstStyle/>
-                    <a:p>
-                      <a:r>
-                        <a:rPr lang="en-US" dirty="0">
-                          <a:solidFill>
-                            <a:schemeClr val="accent6"/>
-                          </a:solidFill>
-                        </a:rPr>
-                        <a:t>80</a:t>
-                      </a:r>
-                    </a:p>
-                  </a:txBody>
-                  <a:tcPr anchor="ctr"/>
-                </a:tc>
-                <a:tc>
-                  <a:txBody>
-                    <a:bodyPr/>
-                    <a:lstStyle/>
-                    <a:p>
-                      <a:r>
-                        <a:rPr lang="en-US" dirty="0">
-                          <a:solidFill>
-                            <a:schemeClr val="accent6"/>
-                          </a:solidFill>
-                        </a:rPr>
-                        <a:t>85</a:t>
-                      </a:r>
-                    </a:p>
-                  </a:txBody>
-                  <a:tcPr anchor="ctr"/>
-                </a:tc>
-                <a:extLst>
-                  <a:ext uri="{0D108BD9-81ED-4DB2-BD59-A6C34878D82A}">
-                    <a16:rowId xmlns:a16="http://schemas.microsoft.com/office/drawing/2014/main" val="2426564953"/>
-                  </a:ext>
-                </a:extLst>
-              </a:tr>
-            </a:tbl>
-          </a:graphicData>
-        </a:graphic>
-      </p:graphicFrame>
-      <p:sp>
-        <p:nvSpPr>
-          <p:cNvPr id="2" name="Slide Number Placeholder 1">
-            <a:extLst>
-              <a:ext uri="{FF2B5EF4-FFF2-40B4-BE49-F238E27FC236}">
-                <a16:creationId xmlns:a16="http://schemas.microsoft.com/office/drawing/2014/main" id="{A913EEC9-16E3-6C86-97D0-A7EC7EA09CDA}"/>
-              </a:ext>
-            </a:extLst>
-          </p:cNvPr>
-          <p:cNvSpPr>
-            <a:spLocks noGrp="1"/>
-          </p:cNvSpPr>
-          <p:nvPr>
-            <p:ph type="sldNum" sz="quarter" idx="10"/>
-          </p:nvPr>
-        </p:nvSpPr>
-        <p:spPr>
-          <a:xfrm>
-            <a:off x="10358437" y="457199"/>
-            <a:ext cx="1067589" cy="471489"/>
-          </a:xfrm>
-        </p:spPr>
-        <p:txBody>
-          <a:bodyPr/>
-          <a:lstStyle/>
-          <a:p>
-            <a:fld id="{48F63A3B-78C7-47BE-AE5E-E10140E04643}" type="slidenum">
-              <a:rPr lang="en-US" smtClean="0"/>
-              <a:pPr/>
-              <a:t>11</a:t>
-            </a:fld>
-            <a:endParaRPr lang="en-US" dirty="0"/>
-          </a:p>
-        </p:txBody>
-      </p:sp>
-    </p:spTree>
-    <p:extLst>
-      <p:ext uri="{BB962C8B-B14F-4D97-AF65-F5344CB8AC3E}">
-        <p14:creationId xmlns:p14="http://schemas.microsoft.com/office/powerpoint/2010/main" val="3969996159"/>
-      </p:ext>
-    </p:extLst>
-  </p:cSld>
-  <p:clrMapOvr>
-    <a:masterClrMapping/>
-  </p:clrMapOvr>
-</p:sld>
-</file>
-
-<file path=ppt/slides/slide12.xml><?xml version="1.0" encoding="utf-8"?>
-<p:sld xmlns:a="http://schemas.openxmlformats.org/drawingml/2006/main" xmlns:r="http://schemas.openxmlformats.org/officeDocument/2006/relationships" xmlns:p="http://schemas.openxmlformats.org/presentationml/2006/main">
-  <p:cSld>
-    <p:spTree>
-      <p:nvGrpSpPr>
-        <p:cNvPr id="1" name=""/>
-        <p:cNvGrpSpPr/>
-        <p:nvPr/>
-      </p:nvGrpSpPr>
-      <p:grpSpPr>
-        <a:xfrm>
-          <a:off x="0" y="0"/>
-          <a:ext cx="0" cy="0"/>
-          <a:chOff x="0" y="0"/>
-          <a:chExt cx="0" cy="0"/>
-        </a:xfrm>
-      </p:grpSpPr>
-      <p:sp>
-        <p:nvSpPr>
-          <p:cNvPr id="3" name="Title 2">
-            <a:extLst>
-              <a:ext uri="{FF2B5EF4-FFF2-40B4-BE49-F238E27FC236}">
-                <a16:creationId xmlns:a16="http://schemas.microsoft.com/office/drawing/2014/main" id="{38D62608-F5E4-7EC0-5EF0-4F988DDDEC5B}"/>
-              </a:ext>
-            </a:extLst>
-          </p:cNvPr>
-          <p:cNvSpPr>
-            <a:spLocks noGrp="1"/>
-          </p:cNvSpPr>
-          <p:nvPr>
-            <p:ph type="title"/>
-          </p:nvPr>
-        </p:nvSpPr>
-        <p:spPr>
-          <a:xfrm>
-            <a:off x="1550564" y="1057274"/>
-            <a:ext cx="9875463" cy="999746"/>
-          </a:xfrm>
-        </p:spPr>
-        <p:txBody>
-          <a:bodyPr/>
-          <a:lstStyle/>
-          <a:p>
-            <a:r>
-              <a:rPr lang="ru-RU" dirty="0"/>
-              <a:t>Заключение и возможности для развития</a:t>
-            </a:r>
-            <a:endParaRPr lang="en-US" dirty="0"/>
-          </a:p>
-        </p:txBody>
-      </p:sp>
-      <p:sp>
-        <p:nvSpPr>
-          <p:cNvPr id="12" name="Content Placeholder 3">
-            <a:extLst>
-              <a:ext uri="{FF2B5EF4-FFF2-40B4-BE49-F238E27FC236}">
-                <a16:creationId xmlns:a16="http://schemas.microsoft.com/office/drawing/2014/main" id="{288BD9B8-D6A6-D55A-830D-4D3CC2DC3933}"/>
-              </a:ext>
-            </a:extLst>
-          </p:cNvPr>
-          <p:cNvSpPr>
-            <a:spLocks noGrp="1"/>
-          </p:cNvSpPr>
-          <p:nvPr>
-            <p:ph sz="half" idx="2"/>
-          </p:nvPr>
-        </p:nvSpPr>
-        <p:spPr>
-          <a:xfrm>
-            <a:off x="1550564" y="2303028"/>
-            <a:ext cx="5829147" cy="3961593"/>
-          </a:xfrm>
-        </p:spPr>
-        <p:txBody>
-          <a:bodyPr>
-            <a:normAutofit/>
-          </a:bodyPr>
-          <a:lstStyle/>
-          <a:p>
-            <a:r>
-              <a:rPr lang="ru-RU" dirty="0"/>
-              <a:t>Добавить роли на сайте</a:t>
-            </a:r>
-          </a:p>
-          <a:p>
-            <a:r>
-              <a:rPr lang="ru-RU" dirty="0"/>
-              <a:t>И потом ещё всякого, пока что есть время до финального дедлайна</a:t>
-            </a:r>
-            <a:r>
-              <a:rPr lang="en-US" dirty="0"/>
-              <a:t>: </a:t>
-            </a:r>
-            <a:r>
-              <a:rPr lang="ru-RU" dirty="0"/>
-              <a:t>Доделаю потом.</a:t>
-            </a:r>
-            <a:endParaRPr lang="en-US" dirty="0"/>
-          </a:p>
-        </p:txBody>
-      </p:sp>
-      <p:sp>
-        <p:nvSpPr>
-          <p:cNvPr id="13" name="Content Placeholder 7">
-            <a:extLst>
-              <a:ext uri="{FF2B5EF4-FFF2-40B4-BE49-F238E27FC236}">
-                <a16:creationId xmlns:a16="http://schemas.microsoft.com/office/drawing/2014/main" id="{0853098E-C088-D323-4BF2-987893F262F6}"/>
-              </a:ext>
-            </a:extLst>
-          </p:cNvPr>
-          <p:cNvSpPr>
-            <a:spLocks noGrp="1"/>
-          </p:cNvSpPr>
-          <p:nvPr>
-            <p:ph sz="half" idx="15"/>
-          </p:nvPr>
-        </p:nvSpPr>
-        <p:spPr>
-          <a:xfrm>
-            <a:off x="7940842" y="2303028"/>
-            <a:ext cx="3485184" cy="3961593"/>
-          </a:xfrm>
-        </p:spPr>
-        <p:txBody>
-          <a:bodyPr/>
-          <a:lstStyle/>
-          <a:p>
-            <a:endParaRPr lang="en-US" dirty="0"/>
-          </a:p>
-        </p:txBody>
-      </p:sp>
-      <p:sp>
-        <p:nvSpPr>
-          <p:cNvPr id="2" name="Slide Number Placeholder 1">
-            <a:extLst>
-              <a:ext uri="{FF2B5EF4-FFF2-40B4-BE49-F238E27FC236}">
-                <a16:creationId xmlns:a16="http://schemas.microsoft.com/office/drawing/2014/main" id="{1DCFAD14-1AAA-8CDA-A49B-523FD6C66F35}"/>
-              </a:ext>
-            </a:extLst>
-          </p:cNvPr>
-          <p:cNvSpPr>
-            <a:spLocks noGrp="1"/>
-          </p:cNvSpPr>
-          <p:nvPr>
-            <p:ph type="sldNum" sz="quarter" idx="10"/>
-          </p:nvPr>
-        </p:nvSpPr>
-        <p:spPr>
-          <a:xfrm>
-            <a:off x="10438475" y="457199"/>
-            <a:ext cx="987552" cy="471489"/>
-          </a:xfrm>
-        </p:spPr>
-        <p:txBody>
-          <a:bodyPr/>
-          <a:lstStyle/>
-          <a:p>
-            <a:fld id="{48F63A3B-78C7-47BE-AE5E-E10140E04643}" type="slidenum">
-              <a:rPr lang="en-US" smtClean="0"/>
-              <a:pPr/>
-              <a:t>12</a:t>
-            </a:fld>
-            <a:endParaRPr lang="en-US" dirty="0"/>
-          </a:p>
-        </p:txBody>
-      </p:sp>
-    </p:spTree>
-    <p:extLst>
-      <p:ext uri="{BB962C8B-B14F-4D97-AF65-F5344CB8AC3E}">
-        <p14:creationId xmlns:p14="http://schemas.microsoft.com/office/powerpoint/2010/main" val="2498021601"/>
       </p:ext>
     </p:extLst>
   </p:cSld>
@@ -18873,40 +18517,6 @@
             <a:r>
               <a:rPr lang="ru-RU" dirty="0"/>
               <a:t>Спасибо за внимание</a:t>
-            </a:r>
-            <a:endParaRPr lang="en-US" dirty="0"/>
-          </a:p>
-        </p:txBody>
-      </p:sp>
-      <p:sp>
-        <p:nvSpPr>
-          <p:cNvPr id="3" name="Subtitle 2">
-            <a:extLst>
-              <a:ext uri="{FF2B5EF4-FFF2-40B4-BE49-F238E27FC236}">
-                <a16:creationId xmlns:a16="http://schemas.microsoft.com/office/drawing/2014/main" id="{D8B5CEF2-E667-BBB5-2EA6-C06F93B6DE12}"/>
-              </a:ext>
-            </a:extLst>
-          </p:cNvPr>
-          <p:cNvSpPr>
-            <a:spLocks noGrp="1"/>
-          </p:cNvSpPr>
-          <p:nvPr>
-            <p:ph type="subTitle" idx="1"/>
-          </p:nvPr>
-        </p:nvSpPr>
-        <p:spPr>
-          <a:xfrm>
-            <a:off x="914401" y="3813606"/>
-            <a:ext cx="5715000" cy="2234642"/>
-          </a:xfrm>
-        </p:spPr>
-        <p:txBody>
-          <a:bodyPr/>
-          <a:lstStyle/>
-          <a:p>
-            <a:r>
-              <a:rPr lang="ru-RU" dirty="0"/>
-              <a:t>Коннов Елисей</a:t>
             </a:r>
             <a:endParaRPr lang="en-US" dirty="0"/>
           </a:p>
@@ -19011,25 +18621,27 @@
           <a:p>
             <a:r>
               <a:rPr lang="ru-RU" dirty="0"/>
-              <a:t>Потом навигацию устроб</a:t>
+              <a:t>Реализация</a:t>
             </a:r>
+            <a:endParaRPr lang="en-US" dirty="0"/>
           </a:p>
           <a:p>
             <a:r>
-              <a:rPr lang="en-US" dirty="0"/>
-              <a:t>Engaging the audience</a:t>
+              <a:rPr lang="ru-RU" dirty="0"/>
+              <a:t>Прочее</a:t>
             </a:r>
-          </a:p>
-          <a:p>
-            <a:r>
-              <a:rPr lang="en-US" dirty="0"/>
-              <a:t>Visual aids</a:t>
-            </a:r>
+            <a:endParaRPr lang="en-US" dirty="0"/>
           </a:p>
           <a:p>
             <a:r>
               <a:rPr lang="ru-RU" dirty="0"/>
               <a:t>Заключение и идеи для развития</a:t>
+            </a:r>
+          </a:p>
+          <a:p>
+            <a:r>
+              <a:rPr lang="ru-RU" dirty="0"/>
+              <a:t>Демонстрация</a:t>
             </a:r>
             <a:endParaRPr lang="en-US" dirty="0"/>
           </a:p>
@@ -19362,9 +18974,12 @@
           <a:p>
             <a:r>
               <a:rPr lang="ru-RU" dirty="0"/>
-              <a:t>Вступление! =)</a:t>
+              <a:t>Вступление</a:t>
             </a:r>
-            <a:endParaRPr lang="en-US" dirty="0"/>
+            <a:r>
+              <a:rPr lang="en-US" dirty="0"/>
+              <a:t>!</a:t>
+            </a:r>
           </a:p>
         </p:txBody>
       </p:sp>
@@ -19425,7 +19040,7 @@
           <a:p>
             <a:r>
               <a:rPr lang="ru-RU" dirty="0"/>
-              <a:t>Есть рейтинги, горячие новости и категории</a:t>
+              <a:t>Есть оценки, горячие новости и категории</a:t>
             </a:r>
             <a:endParaRPr lang="en-US" dirty="0"/>
           </a:p>
@@ -19524,7 +19139,15 @@
           <a:p>
             <a:r>
               <a:rPr lang="ru-RU" dirty="0"/>
-              <a:t>Продукт и содержимое</a:t>
+              <a:t>Продукт</a:t>
+            </a:r>
+            <a:r>
+              <a:rPr lang="en-US" dirty="0"/>
+              <a:t>,</a:t>
+            </a:r>
+            <a:r>
+              <a:rPr lang="ru-RU" dirty="0"/>
+              <a:t> содержимое и реализация</a:t>
             </a:r>
             <a:endParaRPr lang="en-US" dirty="0"/>
           </a:p>
@@ -19728,23 +19351,15 @@
           <a:p>
             <a:r>
               <a:rPr lang="ru-RU" dirty="0"/>
-              <a:t>Это новостной портал, который был разработан специально для образовательной организации </a:t>
+              <a:t>Это новостной портал, который был разработан специально для какой-то образовательной организации, где пользователи имеют всё то, что и на любом новостном портале</a:t>
             </a:r>
             <a:r>
               <a:rPr lang="en-US" dirty="0"/>
-              <a:t>“</a:t>
+              <a:t>. </a:t>
             </a:r>
             <a:r>
               <a:rPr lang="ru-RU" dirty="0"/>
-              <a:t>Яндекс Лицей</a:t>
-            </a:r>
-            <a:r>
-              <a:rPr lang="en-US" dirty="0"/>
-              <a:t>”</a:t>
-            </a:r>
-            <a:r>
-              <a:rPr lang="ru-RU" dirty="0"/>
-              <a:t>, где пользователи имеют всё то, что и на любом новостном портале</a:t>
+              <a:t>Он сделан, чтобы получить баллы в рейтинге Яндекс Лицея. Или наполнить мир новыми и креативными статьями.</a:t>
             </a:r>
             <a:endParaRPr lang="en-US" dirty="0"/>
           </a:p>
@@ -19780,7 +19395,7 @@
           <a:p>
             <a:r>
               <a:rPr lang="ru-RU" dirty="0"/>
-              <a:t>Новости бывают разные, а именно</a:t>
+              <a:t>Новости бывают разные</a:t>
             </a:r>
             <a:r>
               <a:rPr lang="en-US" dirty="0"/>
@@ -19788,7 +19403,15 @@
             </a:r>
             <a:r>
               <a:rPr lang="ru-RU" dirty="0"/>
-              <a:t>Посты, новости и статьи. Есть всего 3 категории, как и годовых курса в Яндекс Лицее. </a:t>
+              <a:t>Зелёные, синие, красные. А именно</a:t>
+            </a:r>
+            <a:r>
+              <a:rPr lang="en-US" dirty="0"/>
+              <a:t>: </a:t>
+            </a:r>
+            <a:r>
+              <a:rPr lang="ru-RU" dirty="0"/>
+              <a:t>Пост, Статья и Новость. Есть всего 3 категории, как и годовых курса в Яндекс Лицее. </a:t>
             </a:r>
             <a:endParaRPr lang="en-US" dirty="0"/>
           </a:p>
@@ -19827,6 +19450,96 @@
           </a:p>
         </p:txBody>
       </p:sp>
+      <p:pic>
+        <p:nvPicPr>
+          <p:cNvPr id="5" name="Picture 4">
+            <a:extLst>
+              <a:ext uri="{FF2B5EF4-FFF2-40B4-BE49-F238E27FC236}">
+                <a16:creationId xmlns:a16="http://schemas.microsoft.com/office/drawing/2014/main" id="{DF00DA2E-C350-C027-6B12-10873EA722F1}"/>
+              </a:ext>
+            </a:extLst>
+          </p:cNvPr>
+          <p:cNvPicPr>
+            <a:picLocks noChangeAspect="1"/>
+          </p:cNvPicPr>
+          <p:nvPr/>
+        </p:nvPicPr>
+        <p:blipFill>
+          <a:blip r:embed="rId3"/>
+          <a:stretch>
+            <a:fillRect/>
+          </a:stretch>
+        </p:blipFill>
+        <p:spPr>
+          <a:xfrm>
+            <a:off x="7609113" y="2531807"/>
+            <a:ext cx="542925" cy="381515"/>
+          </a:xfrm>
+          <a:prstGeom prst="rect">
+            <a:avLst/>
+          </a:prstGeom>
+        </p:spPr>
+      </p:pic>
+      <p:pic>
+        <p:nvPicPr>
+          <p:cNvPr id="7" name="Picture 6">
+            <a:extLst>
+              <a:ext uri="{FF2B5EF4-FFF2-40B4-BE49-F238E27FC236}">
+                <a16:creationId xmlns:a16="http://schemas.microsoft.com/office/drawing/2014/main" id="{5CD24833-6063-4679-4F66-A07077DCFFA6}"/>
+              </a:ext>
+            </a:extLst>
+          </p:cNvPr>
+          <p:cNvPicPr>
+            <a:picLocks noChangeAspect="1"/>
+          </p:cNvPicPr>
+          <p:nvPr/>
+        </p:nvPicPr>
+        <p:blipFill>
+          <a:blip r:embed="rId4"/>
+          <a:stretch>
+            <a:fillRect/>
+          </a:stretch>
+        </p:blipFill>
+        <p:spPr>
+          <a:xfrm>
+            <a:off x="4873864" y="2812311"/>
+            <a:ext cx="694180" cy="395607"/>
+          </a:xfrm>
+          <a:prstGeom prst="rect">
+            <a:avLst/>
+          </a:prstGeom>
+        </p:spPr>
+      </p:pic>
+      <p:pic>
+        <p:nvPicPr>
+          <p:cNvPr id="9" name="Picture 8">
+            <a:extLst>
+              <a:ext uri="{FF2B5EF4-FFF2-40B4-BE49-F238E27FC236}">
+                <a16:creationId xmlns:a16="http://schemas.microsoft.com/office/drawing/2014/main" id="{B0251B7D-7E86-FAA5-ABDB-C1DF2D4B8A18}"/>
+              </a:ext>
+            </a:extLst>
+          </p:cNvPr>
+          <p:cNvPicPr>
+            <a:picLocks noChangeAspect="1"/>
+          </p:cNvPicPr>
+          <p:nvPr/>
+        </p:nvPicPr>
+        <p:blipFill>
+          <a:blip r:embed="rId5"/>
+          <a:stretch>
+            <a:fillRect/>
+          </a:stretch>
+        </p:blipFill>
+        <p:spPr>
+          <a:xfrm>
+            <a:off x="5816397" y="2812311"/>
+            <a:ext cx="874236" cy="333422"/>
+          </a:xfrm>
+          <a:prstGeom prst="rect">
+            <a:avLst/>
+          </a:prstGeom>
+        </p:spPr>
+      </p:pic>
     </p:spTree>
     <p:extLst>
       <p:ext uri="{BB962C8B-B14F-4D97-AF65-F5344CB8AC3E}">
@@ -19925,14 +19638,27 @@
           <a:p>
             <a:r>
               <a:rPr lang="ru-RU" dirty="0"/>
-              <a:t>Для управления аккаунтом есть очень удобный уникальный и современный интерфейс</a:t>
+              <a:t>Для управления аккаунтом есть </a:t>
             </a:r>
-          </a:p>
-          <a:p>
+            <a:r>
+              <a:rPr lang="en-US" dirty="0"/>
+              <a:t>“</a:t>
+            </a:r>
             <a:r>
               <a:rPr lang="ru-RU" dirty="0"/>
-              <a:t>Вы можете изменять свой профиль, указывать новые данные и делать их доступными или скрытыми для просмотра другими пользователями</a:t>
+              <a:t>очень понятный и современный</a:t>
             </a:r>
+            <a:r>
+              <a:rPr lang="en-US" dirty="0"/>
+              <a:t>”</a:t>
+            </a:r>
+            <a:r>
+              <a:rPr lang="ru-RU" dirty="0"/>
+              <a:t> интерфейс.</a:t>
+            </a:r>
+          </a:p>
+          <a:p>
+            <a:endParaRPr lang="ru-RU" dirty="0"/>
           </a:p>
         </p:txBody>
       </p:sp>
@@ -20009,10 +19735,10 @@
       </p:sp>
       <p:pic>
         <p:nvPicPr>
-          <p:cNvPr id="9" name="Picture 8">
+          <p:cNvPr id="14" name="Picture 13">
             <a:extLst>
               <a:ext uri="{FF2B5EF4-FFF2-40B4-BE49-F238E27FC236}">
-                <a16:creationId xmlns:a16="http://schemas.microsoft.com/office/drawing/2014/main" id="{A6A6F4B1-3DEA-B198-4E47-3F53F2DA5785}"/>
+                <a16:creationId xmlns:a16="http://schemas.microsoft.com/office/drawing/2014/main" id="{B0B819FB-E5AF-3ABC-DE1A-17F400C52DEF}"/>
               </a:ext>
             </a:extLst>
           </p:cNvPr>
@@ -20029,8 +19755,38 @@
         </p:blipFill>
         <p:spPr>
           <a:xfrm>
-            <a:off x="6737532" y="329000"/>
-            <a:ext cx="2410161" cy="1247949"/>
+            <a:off x="914400" y="4192699"/>
+            <a:ext cx="1351189" cy="1014794"/>
+          </a:xfrm>
+          <a:prstGeom prst="rect">
+            <a:avLst/>
+          </a:prstGeom>
+        </p:spPr>
+      </p:pic>
+      <p:pic>
+        <p:nvPicPr>
+          <p:cNvPr id="16" name="Picture 15">
+            <a:extLst>
+              <a:ext uri="{FF2B5EF4-FFF2-40B4-BE49-F238E27FC236}">
+                <a16:creationId xmlns:a16="http://schemas.microsoft.com/office/drawing/2014/main" id="{7E0D7BC7-C24E-6ECA-161A-BF937486A148}"/>
+              </a:ext>
+            </a:extLst>
+          </p:cNvPr>
+          <p:cNvPicPr>
+            <a:picLocks noChangeAspect="1"/>
+          </p:cNvPicPr>
+          <p:nvPr/>
+        </p:nvPicPr>
+        <p:blipFill>
+          <a:blip r:embed="rId5"/>
+          <a:stretch>
+            <a:fillRect/>
+          </a:stretch>
+        </p:blipFill>
+        <p:spPr>
+          <a:xfrm>
+            <a:off x="3437567" y="4192699"/>
+            <a:ext cx="1197867" cy="1289619"/>
           </a:xfrm>
           <a:prstGeom prst="rect">
             <a:avLst/>
@@ -20125,7 +19881,7 @@
         </p:spPr>
         <p:txBody>
           <a:bodyPr>
-            <a:normAutofit/>
+            <a:normAutofit lnSpcReduction="10000"/>
           </a:bodyPr>
           <a:lstStyle/>
           <a:p>
@@ -20134,9 +19890,12 @@
             </a:pPr>
             <a:r>
               <a:rPr lang="ru-RU" dirty="0"/>
-              <a:t>Новости бывают</a:t>
+              <a:t>Типы новостей</a:t>
             </a:r>
-            <a:endParaRPr lang="en-US" dirty="0"/>
+            <a:r>
+              <a:rPr lang="en-US" dirty="0"/>
+              <a:t>:</a:t>
+            </a:r>
           </a:p>
           <a:p>
             <a:r>
@@ -20160,6 +19919,18 @@
             <a:pPr marL="0" indent="0">
               <a:buNone/>
             </a:pPr>
+            <a:r>
+              <a:rPr lang="en-US" dirty="0"/>
+              <a:t>(</a:t>
+            </a:r>
+            <a:r>
+              <a:rPr lang="ru-RU" dirty="0"/>
+              <a:t>Отличаются лишь названием</a:t>
+            </a:r>
+            <a:r>
+              <a:rPr lang="en-US" dirty="0"/>
+              <a:t>)</a:t>
+            </a:r>
             <a:endParaRPr lang="ru-RU" dirty="0"/>
           </a:p>
         </p:txBody>
@@ -20192,7 +19963,7 @@
           <a:p>
             <a:r>
               <a:rPr lang="ru-RU" dirty="0"/>
-              <a:t>У всего есть комментарии</a:t>
+              <a:t>Есть комментарии</a:t>
             </a:r>
           </a:p>
           <a:p>
@@ -20202,7 +19973,10 @@
             </a:r>
           </a:p>
           <a:p>
-            <a:endParaRPr lang="ru-RU" dirty="0"/>
+            <a:r>
+              <a:rPr lang="ru-RU" dirty="0"/>
+              <a:t>Комментарии, оценки и просмотры влияют на горячесть статей.</a:t>
+            </a:r>
           </a:p>
           <a:p>
             <a:endParaRPr lang="ru-RU" dirty="0"/>
@@ -20301,7 +20075,7 @@
         <p:spPr>
           <a:xfrm>
             <a:off x="914400" y="4352306"/>
-            <a:ext cx="3282951" cy="1200329"/>
+            <a:ext cx="3282951" cy="1477328"/>
           </a:xfrm>
           <a:prstGeom prst="rect">
             <a:avLst/>
@@ -20320,7 +20094,7 @@
                   <a:schemeClr val="accent6"/>
                 </a:solidFill>
               </a:rPr>
-              <a:t>У новостей есть теги, которые пользователи вправе указывать сами и нужны лишь для пользователей. </a:t>
+              <a:t>У новостей есть теги, которые пользователи вправе указывать сами и нужны лишь для понимания самих пользователей. </a:t>
             </a:r>
           </a:p>
         </p:txBody>
@@ -21221,6 +20995,15 @@
 </file>
 
 <file path=customXml/item1.xml><?xml version="1.0" encoding="utf-8"?>
+<?mso-contentType ?>
+<FormTemplates xmlns="http://schemas.microsoft.com/sharepoint/v3/contenttype/forms">
+  <Display>DocumentLibraryForm</Display>
+  <Edit>DocumentLibraryForm</Edit>
+  <New>DocumentLibraryForm</New>
+</FormTemplates>
+</file>
+
+<file path=customXml/item2.xml><?xml version="1.0" encoding="utf-8"?>
 <p:properties xmlns:p="http://schemas.microsoft.com/office/2006/metadata/properties" xmlns:xsi="http://www.w3.org/2001/XMLSchema-instance" xmlns:pc="http://schemas.microsoft.com/office/infopath/2007/PartnerControls">
   <documentManagement>
     <_ip_UnifiedCompliancePolicyUIAction xmlns="http://schemas.microsoft.com/sharepoint/v3" xsi:nil="true"/>
@@ -21238,15 +21021,6 @@
     <MediaServiceKeyPoints xmlns="71af3243-3dd4-4a8d-8c0d-dd76da1f02a5" xsi:nil="true"/>
   </documentManagement>
 </p:properties>
-</file>
-
-<file path=customXml/item2.xml><?xml version="1.0" encoding="utf-8"?>
-<?mso-contentType ?>
-<FormTemplates xmlns="http://schemas.microsoft.com/sharepoint/v3/contenttype/forms">
-  <Display>DocumentLibraryForm</Display>
-  <Edit>DocumentLibraryForm</Edit>
-  <New>DocumentLibraryForm</New>
-</FormTemplates>
 </file>
 
 <file path=customXml/item3.xml><?xml version="1.0" encoding="utf-8"?>
@@ -21562,6 +21336,14 @@
 </file>
 
 <file path=customXml/itemProps1.xml><?xml version="1.0" encoding="utf-8"?>
+<ds:datastoreItem xmlns:ds="http://schemas.openxmlformats.org/officeDocument/2006/customXml" ds:itemID="{16DBB56F-4362-4386-A1A1-3DF898896616}">
+  <ds:schemaRefs>
+    <ds:schemaRef ds:uri="http://schemas.microsoft.com/sharepoint/v3/contenttype/forms"/>
+  </ds:schemaRefs>
+</ds:datastoreItem>
+</file>
+
+<file path=customXml/itemProps2.xml><?xml version="1.0" encoding="utf-8"?>
 <ds:datastoreItem xmlns:ds="http://schemas.openxmlformats.org/officeDocument/2006/customXml" ds:itemID="{BA719FA4-954C-4FA8-82CB-206659C3B826}">
   <ds:schemaRefs>
     <ds:schemaRef ds:uri="http://schemas.microsoft.com/office/2006/metadata/properties"/>
@@ -21569,14 +21351,6 @@
     <ds:schemaRef ds:uri="http://schemas.microsoft.com/sharepoint/v3"/>
     <ds:schemaRef ds:uri="71af3243-3dd4-4a8d-8c0d-dd76da1f02a5"/>
     <ds:schemaRef ds:uri="230e9df3-be65-4c73-a93b-d1236ebd677e"/>
-  </ds:schemaRefs>
-</ds:datastoreItem>
-</file>
-
-<file path=customXml/itemProps2.xml><?xml version="1.0" encoding="utf-8"?>
-<ds:datastoreItem xmlns:ds="http://schemas.openxmlformats.org/officeDocument/2006/customXml" ds:itemID="{16DBB56F-4362-4386-A1A1-3DF898896616}">
-  <ds:schemaRefs>
-    <ds:schemaRef ds:uri="http://schemas.microsoft.com/sharepoint/v3/contenttype/forms"/>
   </ds:schemaRefs>
 </ds:datastoreItem>
 </file>

</xml_diff>